<commit_message>
Final Version PPT Resutrctured For Final PPT
</commit_message>
<xml_diff>
--- a/Rizwan-Questions and Answers for PPT.pptx
+++ b/Rizwan-Questions and Answers for PPT.pptx
@@ -4754,7 +4754,7 @@
         </p:blipFill>
         <p:spPr>
           <a:xfrm>
-            <a:off x="306443" y="3568420"/>
+            <a:off x="406030" y="928744"/>
             <a:ext cx="5514807" cy="2994398"/>
           </a:xfrm>
           <a:prstGeom prst="rect">
@@ -4784,8 +4784,8 @@
         </p:blipFill>
         <p:spPr>
           <a:xfrm>
-            <a:off x="581191" y="1658985"/>
-            <a:ext cx="3501913" cy="1852756"/>
+            <a:off x="406031" y="3940283"/>
+            <a:ext cx="5514807" cy="2917717"/>
           </a:xfrm>
           <a:prstGeom prst="rect">
             <a:avLst/>
@@ -4888,8 +4888,8 @@
         </p:blipFill>
         <p:spPr>
           <a:xfrm>
-            <a:off x="581191" y="3958111"/>
-            <a:ext cx="4712025" cy="2629508"/>
+            <a:off x="137570" y="741516"/>
+            <a:ext cx="5648023" cy="3151834"/>
           </a:xfrm>
           <a:prstGeom prst="rect">
             <a:avLst/>
@@ -4918,8 +4918,8 @@
         </p:blipFill>
         <p:spPr>
           <a:xfrm>
-            <a:off x="706888" y="1897577"/>
-            <a:ext cx="2838665" cy="2004624"/>
+            <a:off x="137570" y="3974832"/>
+            <a:ext cx="4178888" cy="2951070"/>
           </a:xfrm>
           <a:prstGeom prst="rect">
             <a:avLst/>
@@ -5858,6 +5858,23 @@
 </file>
 
 <file path=customXml/item1.xml><?xml version="1.0" encoding="utf-8"?>
+<p:properties xmlns:p="http://schemas.microsoft.com/office/2006/metadata/properties" xmlns:xsi="http://www.w3.org/2001/XMLSchema-instance" xmlns:pc="http://schemas.microsoft.com/office/infopath/2007/PartnerControls">
+  <documentManagement>
+    <MediaServiceKeyPoints xmlns="71af3243-3dd4-4a8d-8c0d-dd76da1f02a5" xsi:nil="true"/>
+  </documentManagement>
+</p:properties>
+</file>
+
+<file path=customXml/item2.xml><?xml version="1.0" encoding="utf-8"?>
+<?mso-contentType ?>
+<FormTemplates xmlns="http://schemas.microsoft.com/sharepoint/v3/contenttype/forms">
+  <Display>DocumentLibraryForm</Display>
+  <Edit>DocumentLibraryForm</Edit>
+  <New>DocumentLibraryForm</New>
+</FormTemplates>
+</file>
+
+<file path=customXml/item3.xml><?xml version="1.0" encoding="utf-8"?>
 <ct:contentTypeSchema xmlns:ct="http://schemas.microsoft.com/office/2006/metadata/contentType" xmlns:ma="http://schemas.microsoft.com/office/2006/metadata/properties/metaAttributes" ct:_="" ma:_="" ma:contentTypeName="Document" ma:contentTypeID="0x01010079F111ED35F8CC479449609E8A0923A6" ma:contentTypeVersion="11" ma:contentTypeDescription="Create a new document." ma:contentTypeScope="" ma:versionID="1c2eb7a32e66fb6e4260f3771546a5e2">
   <xsd:schema xmlns:xsd="http://www.w3.org/2001/XMLSchema" xmlns:xs="http://www.w3.org/2001/XMLSchema" xmlns:p="http://schemas.microsoft.com/office/2006/metadata/properties" xmlns:ns2="71af3243-3dd4-4a8d-8c0d-dd76da1f02a5" xmlns:ns3="16c05727-aa75-4e4a-9b5f-8a80a1165891" targetNamespace="http://schemas.microsoft.com/office/2006/metadata/properties" ma:root="true" ma:fieldsID="04e1f6479c48b08974ba73b5ca973489" ns2:_="" ns3:_="">
     <xsd:import namespace="71af3243-3dd4-4a8d-8c0d-dd76da1f02a5"/>
@@ -6068,24 +6085,25 @@
 </ct:contentTypeSchema>
 </file>
 
-<file path=customXml/item2.xml><?xml version="1.0" encoding="utf-8"?>
-<?mso-contentType ?>
-<FormTemplates xmlns="http://schemas.microsoft.com/sharepoint/v3/contenttype/forms">
-  <Display>DocumentLibraryForm</Display>
-  <Edit>DocumentLibraryForm</Edit>
-  <New>DocumentLibraryForm</New>
-</FormTemplates>
+<file path=customXml/itemProps1.xml><?xml version="1.0" encoding="utf-8"?>
+<ds:datastoreItem xmlns:ds="http://schemas.openxmlformats.org/officeDocument/2006/customXml" ds:itemID="{1EBC12AA-1C15-4500-BC9C-8EE83A441DE9}">
+  <ds:schemaRefs>
+    <ds:schemaRef ds:uri="http://schemas.microsoft.com/office/2006/metadata/properties"/>
+    <ds:schemaRef ds:uri="http://schemas.microsoft.com/office/infopath/2007/PartnerControls"/>
+    <ds:schemaRef ds:uri="71af3243-3dd4-4a8d-8c0d-dd76da1f02a5"/>
+  </ds:schemaRefs>
+</ds:datastoreItem>
 </file>
 
-<file path=customXml/item3.xml><?xml version="1.0" encoding="utf-8"?>
-<p:properties xmlns:p="http://schemas.microsoft.com/office/2006/metadata/properties" xmlns:xsi="http://www.w3.org/2001/XMLSchema-instance" xmlns:pc="http://schemas.microsoft.com/office/infopath/2007/PartnerControls">
-  <documentManagement>
-    <MediaServiceKeyPoints xmlns="71af3243-3dd4-4a8d-8c0d-dd76da1f02a5" xsi:nil="true"/>
-  </documentManagement>
-</p:properties>
+<file path=customXml/itemProps2.xml><?xml version="1.0" encoding="utf-8"?>
+<ds:datastoreItem xmlns:ds="http://schemas.openxmlformats.org/officeDocument/2006/customXml" ds:itemID="{BA0CF3B2-1F0F-4FC5-8002-3E4869ABAD55}">
+  <ds:schemaRefs>
+    <ds:schemaRef ds:uri="http://schemas.microsoft.com/sharepoint/v3/contenttype/forms"/>
+  </ds:schemaRefs>
+</ds:datastoreItem>
 </file>
 
-<file path=customXml/itemProps1.xml><?xml version="1.0" encoding="utf-8"?>
+<file path=customXml/itemProps3.xml><?xml version="1.0" encoding="utf-8"?>
 <ds:datastoreItem xmlns:ds="http://schemas.openxmlformats.org/officeDocument/2006/customXml" ds:itemID="{1F69AFF4-BB30-4BA0-AD22-82CC3C43276B}">
   <ds:schemaRefs>
     <ds:schemaRef ds:uri="http://schemas.microsoft.com/office/2006/metadata/contentType"/>
@@ -6102,22 +6120,4 @@
     <ds:schemaRef ds:uri="http://schemas.microsoft.com/internal/obd"/>
   </ds:schemaRefs>
 </ds:datastoreItem>
-</file>
-
-<file path=customXml/itemProps2.xml><?xml version="1.0" encoding="utf-8"?>
-<ds:datastoreItem xmlns:ds="http://schemas.openxmlformats.org/officeDocument/2006/customXml" ds:itemID="{BA0CF3B2-1F0F-4FC5-8002-3E4869ABAD55}">
-  <ds:schemaRefs>
-    <ds:schemaRef ds:uri="http://schemas.microsoft.com/sharepoint/v3/contenttype/forms"/>
-  </ds:schemaRefs>
-</ds:datastoreItem>
-</file>
-
-<file path=customXml/itemProps3.xml><?xml version="1.0" encoding="utf-8"?>
-<ds:datastoreItem xmlns:ds="http://schemas.openxmlformats.org/officeDocument/2006/customXml" ds:itemID="{1EBC12AA-1C15-4500-BC9C-8EE83A441DE9}">
-  <ds:schemaRefs>
-    <ds:schemaRef ds:uri="http://schemas.microsoft.com/office/2006/metadata/properties"/>
-    <ds:schemaRef ds:uri="http://schemas.microsoft.com/office/infopath/2007/PartnerControls"/>
-    <ds:schemaRef ds:uri="71af3243-3dd4-4a8d-8c0d-dd76da1f02a5"/>
-  </ds:schemaRefs>
-</ds:datastoreItem>
 </file>
</xml_diff>